<commit_message>
Last Update 13-08-2018  2:17:12.52
</commit_message>
<xml_diff>
--- a/Slides/Unit 2/CS8392-U2-ArrayList.pptx
+++ b/Slides/Unit 2/CS8392-U2-ArrayList.pptx
@@ -199,7 +199,7 @@
             <a:fld id="{9515075B-F3F0-4441-A1BD-B7B515B708FF}" type="datetimeFigureOut">
               <a:rPr lang="en-US" smtClean="0"/>
               <a:pPr/>
-              <a:t>8/10/2018</a:t>
+              <a:t>8/11/2018</a:t>
             </a:fld>
             <a:endParaRPr lang="en-US"/>
           </a:p>
@@ -654,7 +654,7 @@
             <a:fld id="{6E658DF8-B8C0-4C7F-85EB-B53A2DDD44A9}" type="datetimeFigureOut">
               <a:rPr lang="en-US" smtClean="0"/>
               <a:pPr/>
-              <a:t>8/10/2018</a:t>
+              <a:t>8/11/2018</a:t>
             </a:fld>
             <a:endParaRPr lang="en-US"/>
           </a:p>
@@ -821,7 +821,7 @@
             <a:fld id="{6E658DF8-B8C0-4C7F-85EB-B53A2DDD44A9}" type="datetimeFigureOut">
               <a:rPr lang="en-US" smtClean="0"/>
               <a:pPr/>
-              <a:t>8/10/2018</a:t>
+              <a:t>8/11/2018</a:t>
             </a:fld>
             <a:endParaRPr lang="en-US"/>
           </a:p>
@@ -998,7 +998,7 @@
             <a:fld id="{6E658DF8-B8C0-4C7F-85EB-B53A2DDD44A9}" type="datetimeFigureOut">
               <a:rPr lang="en-US" smtClean="0"/>
               <a:pPr/>
-              <a:t>8/10/2018</a:t>
+              <a:t>8/11/2018</a:t>
             </a:fld>
             <a:endParaRPr lang="en-US"/>
           </a:p>
@@ -1197,7 +1197,7 @@
             <a:fld id="{6E658DF8-B8C0-4C7F-85EB-B53A2DDD44A9}" type="datetimeFigureOut">
               <a:rPr lang="en-US" smtClean="0"/>
               <a:pPr/>
-              <a:t>8/10/2018</a:t>
+              <a:t>8/11/2018</a:t>
             </a:fld>
             <a:endParaRPr lang="en-US"/>
           </a:p>
@@ -1440,7 +1440,7 @@
             <a:fld id="{6E658DF8-B8C0-4C7F-85EB-B53A2DDD44A9}" type="datetimeFigureOut">
               <a:rPr lang="en-US" smtClean="0"/>
               <a:pPr/>
-              <a:t>8/10/2018</a:t>
+              <a:t>8/11/2018</a:t>
             </a:fld>
             <a:endParaRPr lang="en-US"/>
           </a:p>
@@ -1725,7 +1725,7 @@
             <a:fld id="{6E658DF8-B8C0-4C7F-85EB-B53A2DDD44A9}" type="datetimeFigureOut">
               <a:rPr lang="en-US" smtClean="0"/>
               <a:pPr/>
-              <a:t>8/10/2018</a:t>
+              <a:t>8/11/2018</a:t>
             </a:fld>
             <a:endParaRPr lang="en-US"/>
           </a:p>
@@ -2144,7 +2144,7 @@
             <a:fld id="{6E658DF8-B8C0-4C7F-85EB-B53A2DDD44A9}" type="datetimeFigureOut">
               <a:rPr lang="en-US" smtClean="0"/>
               <a:pPr/>
-              <a:t>8/10/2018</a:t>
+              <a:t>8/11/2018</a:t>
             </a:fld>
             <a:endParaRPr lang="en-US"/>
           </a:p>
@@ -2259,7 +2259,7 @@
             <a:fld id="{6E658DF8-B8C0-4C7F-85EB-B53A2DDD44A9}" type="datetimeFigureOut">
               <a:rPr lang="en-US" smtClean="0"/>
               <a:pPr/>
-              <a:t>8/10/2018</a:t>
+              <a:t>8/11/2018</a:t>
             </a:fld>
             <a:endParaRPr lang="en-US"/>
           </a:p>
@@ -2351,7 +2351,7 @@
             <a:fld id="{6E658DF8-B8C0-4C7F-85EB-B53A2DDD44A9}" type="datetimeFigureOut">
               <a:rPr lang="en-US" smtClean="0"/>
               <a:pPr/>
-              <a:t>8/10/2018</a:t>
+              <a:t>8/11/2018</a:t>
             </a:fld>
             <a:endParaRPr lang="en-US"/>
           </a:p>
@@ -2625,7 +2625,7 @@
             <a:fld id="{6E658DF8-B8C0-4C7F-85EB-B53A2DDD44A9}" type="datetimeFigureOut">
               <a:rPr lang="en-US" smtClean="0"/>
               <a:pPr/>
-              <a:t>8/10/2018</a:t>
+              <a:t>8/11/2018</a:t>
             </a:fld>
             <a:endParaRPr lang="en-US"/>
           </a:p>
@@ -2875,7 +2875,7 @@
             <a:fld id="{6E658DF8-B8C0-4C7F-85EB-B53A2DDD44A9}" type="datetimeFigureOut">
               <a:rPr lang="en-US" smtClean="0"/>
               <a:pPr/>
-              <a:t>8/10/2018</a:t>
+              <a:t>8/11/2018</a:t>
             </a:fld>
             <a:endParaRPr lang="en-US"/>
           </a:p>
@@ -3091,7 +3091,7 @@
             <a:fld id="{6E658DF8-B8C0-4C7F-85EB-B53A2DDD44A9}" type="datetimeFigureOut">
               <a:rPr lang="en-US" smtClean="0"/>
               <a:pPr/>
-              <a:t>8/10/2018</a:t>
+              <a:t>8/11/2018</a:t>
             </a:fld>
             <a:endParaRPr lang="en-US"/>
           </a:p>
@@ -4289,11 +4289,7 @@
             </a:r>
             <a:r>
               <a:rPr lang="en-US" dirty="0" smtClean="0"/>
-              <a:t> </a:t>
-            </a:r>
-            <a:r>
-              <a:rPr lang="en-US" dirty="0" smtClean="0"/>
-              <a:t>to the list’s current size.</a:t>
+              <a:t> to the list’s current size.</a:t>
             </a:r>
           </a:p>
           <a:p>
@@ -4355,13 +4351,8 @@
             </a:r>
             <a:r>
               <a:rPr lang="en-US" dirty="0" smtClean="0"/>
-              <a:t> The index the last occurrence of a specific element is either returned, or -1 in case the element is not in the list</a:t>
-            </a:r>
-            <a:r>
-              <a:rPr lang="en-US" dirty="0" smtClean="0"/>
-              <a:t>.</a:t>
-            </a:r>
-            <a:endParaRPr lang="en-US" dirty="0" smtClean="0"/>
+              <a:t> The index the last occurrence of a specific element is either returned, or -1 in case the element is not in the list.</a:t>
+            </a:r>
           </a:p>
           <a:p>
             <a:endParaRPr lang="en-IN" dirty="0" smtClean="0"/>

</xml_diff>